<commit_message>
ISIS-2062: removes testing.adoc as a category of domain services - moves SudoService to application-layer-api
Also: isis-core-applib -> isis-applib.
</commit_message>
<xml_diff>
--- a/api/applib/src/main/adoc/modules/applib-svc/images/reference-services/categories.pptx
+++ b/api/applib/src/main/adoc/modules/applib-svc/images/reference-services/categories.pptx
@@ -123,10 +123,6 @@
 </p:presentation>
 </file>
 
-<file path=ppt/revisionInfo.xml><?xml version="1.0" encoding="utf-8"?>
-<p1510:revInfo xmlns:a="http://schemas.openxmlformats.org/drawingml/2006/main" xmlns:r="http://schemas.openxmlformats.org/officeDocument/2006/relationships" xmlns:p1510="http://schemas.microsoft.com/office/powerpoint/2015/10/main"/>
-</file>
-
 <file path=ppt/slideLayouts/slideLayout1.xml><?xml version="1.0" encoding="utf-8"?>
 <p:sldLayout xmlns:a="http://schemas.openxmlformats.org/drawingml/2006/main" xmlns:r="http://schemas.openxmlformats.org/officeDocument/2006/relationships" xmlns:p="http://schemas.openxmlformats.org/presentationml/2006/main" type="title" preserve="1">
   <p:cSld name="Title Slide">
@@ -308,7 +304,7 @@
           <a:p>
             <a:fld id="{EA92691D-FF03-40D7-9ED0-9214EECCD472}" type="datetimeFigureOut">
               <a:rPr lang="en-GB" smtClean="0"/>
-              <a:t>28/12/2017</a:t>
+              <a:t>20/02/2020</a:t>
             </a:fld>
             <a:endParaRPr lang="en-GB"/>
           </a:p>
@@ -478,7 +474,7 @@
           <a:p>
             <a:fld id="{EA92691D-FF03-40D7-9ED0-9214EECCD472}" type="datetimeFigureOut">
               <a:rPr lang="en-GB" smtClean="0"/>
-              <a:t>28/12/2017</a:t>
+              <a:t>20/02/2020</a:t>
             </a:fld>
             <a:endParaRPr lang="en-GB"/>
           </a:p>
@@ -658,7 +654,7 @@
           <a:p>
             <a:fld id="{EA92691D-FF03-40D7-9ED0-9214EECCD472}" type="datetimeFigureOut">
               <a:rPr lang="en-GB" smtClean="0"/>
-              <a:t>28/12/2017</a:t>
+              <a:t>20/02/2020</a:t>
             </a:fld>
             <a:endParaRPr lang="en-GB"/>
           </a:p>
@@ -828,7 +824,7 @@
           <a:p>
             <a:fld id="{EA92691D-FF03-40D7-9ED0-9214EECCD472}" type="datetimeFigureOut">
               <a:rPr lang="en-GB" smtClean="0"/>
-              <a:t>28/12/2017</a:t>
+              <a:t>20/02/2020</a:t>
             </a:fld>
             <a:endParaRPr lang="en-GB"/>
           </a:p>
@@ -1074,7 +1070,7 @@
           <a:p>
             <a:fld id="{EA92691D-FF03-40D7-9ED0-9214EECCD472}" type="datetimeFigureOut">
               <a:rPr lang="en-GB" smtClean="0"/>
-              <a:t>28/12/2017</a:t>
+              <a:t>20/02/2020</a:t>
             </a:fld>
             <a:endParaRPr lang="en-GB"/>
           </a:p>
@@ -1362,7 +1358,7 @@
           <a:p>
             <a:fld id="{EA92691D-FF03-40D7-9ED0-9214EECCD472}" type="datetimeFigureOut">
               <a:rPr lang="en-GB" smtClean="0"/>
-              <a:t>28/12/2017</a:t>
+              <a:t>20/02/2020</a:t>
             </a:fld>
             <a:endParaRPr lang="en-GB"/>
           </a:p>
@@ -1784,7 +1780,7 @@
           <a:p>
             <a:fld id="{EA92691D-FF03-40D7-9ED0-9214EECCD472}" type="datetimeFigureOut">
               <a:rPr lang="en-GB" smtClean="0"/>
-              <a:t>28/12/2017</a:t>
+              <a:t>20/02/2020</a:t>
             </a:fld>
             <a:endParaRPr lang="en-GB"/>
           </a:p>
@@ -1902,7 +1898,7 @@
           <a:p>
             <a:fld id="{EA92691D-FF03-40D7-9ED0-9214EECCD472}" type="datetimeFigureOut">
               <a:rPr lang="en-GB" smtClean="0"/>
-              <a:t>28/12/2017</a:t>
+              <a:t>20/02/2020</a:t>
             </a:fld>
             <a:endParaRPr lang="en-GB"/>
           </a:p>
@@ -1997,7 +1993,7 @@
           <a:p>
             <a:fld id="{EA92691D-FF03-40D7-9ED0-9214EECCD472}" type="datetimeFigureOut">
               <a:rPr lang="en-GB" smtClean="0"/>
-              <a:t>28/12/2017</a:t>
+              <a:t>20/02/2020</a:t>
             </a:fld>
             <a:endParaRPr lang="en-GB"/>
           </a:p>
@@ -2274,7 +2270,7 @@
           <a:p>
             <a:fld id="{EA92691D-FF03-40D7-9ED0-9214EECCD472}" type="datetimeFigureOut">
               <a:rPr lang="en-GB" smtClean="0"/>
-              <a:t>28/12/2017</a:t>
+              <a:t>20/02/2020</a:t>
             </a:fld>
             <a:endParaRPr lang="en-GB"/>
           </a:p>
@@ -2527,7 +2523,7 @@
           <a:p>
             <a:fld id="{EA92691D-FF03-40D7-9ED0-9214EECCD472}" type="datetimeFigureOut">
               <a:rPr lang="en-GB" smtClean="0"/>
-              <a:t>28/12/2017</a:t>
+              <a:t>20/02/2020</a:t>
             </a:fld>
             <a:endParaRPr lang="en-GB"/>
           </a:p>
@@ -2740,7 +2736,7 @@
           <a:p>
             <a:fld id="{EA92691D-FF03-40D7-9ED0-9214EECCD472}" type="datetimeFigureOut">
               <a:rPr lang="en-GB" smtClean="0"/>
-              <a:t>28/12/2017</a:t>
+              <a:t>20/02/2020</a:t>
             </a:fld>
             <a:endParaRPr lang="en-GB"/>
           </a:p>
@@ -3124,7 +3120,7 @@
         <p:spPr>
           <a:xfrm>
             <a:off x="723322" y="3501008"/>
-            <a:ext cx="6873014" cy="2376264"/>
+            <a:ext cx="6873014" cy="1800200"/>
           </a:xfrm>
           <a:prstGeom prst="rect">
             <a:avLst/>
@@ -3530,47 +3526,6 @@
       </p:sp>
       <p:sp>
         <p:nvSpPr>
-          <p:cNvPr id="20" name="Rectangle 19"/>
-          <p:cNvSpPr/>
-          <p:nvPr/>
-        </p:nvSpPr>
-        <p:spPr>
-          <a:xfrm>
-            <a:off x="5907898" y="838729"/>
-            <a:ext cx="1512168" cy="646056"/>
-          </a:xfrm>
-          <a:prstGeom prst="rect">
-            <a:avLst/>
-          </a:prstGeom>
-        </p:spPr>
-        <p:style>
-          <a:lnRef idx="1">
-            <a:schemeClr val="dk1"/>
-          </a:lnRef>
-          <a:fillRef idx="2">
-            <a:schemeClr val="dk1"/>
-          </a:fillRef>
-          <a:effectRef idx="1">
-            <a:schemeClr val="dk1"/>
-          </a:effectRef>
-          <a:fontRef idx="minor">
-            <a:schemeClr val="dk1"/>
-          </a:fontRef>
-        </p:style>
-        <p:txBody>
-          <a:bodyPr rtlCol="0" anchor="ctr"/>
-          <a:lstStyle/>
-          <a:p>
-            <a:pPr algn="ctr"/>
-            <a:r>
-              <a:rPr lang="en-GB" dirty="0"/>
-              <a:t>Testing</a:t>
-            </a:r>
-          </a:p>
-        </p:txBody>
-      </p:sp>
-      <p:sp>
-        <p:nvSpPr>
           <p:cNvPr id="21" name="Rectangle 20"/>
           <p:cNvSpPr/>
           <p:nvPr/>
@@ -3672,47 +3627,6 @@
             <a:r>
               <a:rPr lang="en-GB" dirty="0"/>
               <a:t>SPI</a:t>
-            </a:r>
-          </a:p>
-        </p:txBody>
-      </p:sp>
-      <p:sp>
-        <p:nvSpPr>
-          <p:cNvPr id="17" name="Rectangle 16"/>
-          <p:cNvSpPr/>
-          <p:nvPr/>
-        </p:nvSpPr>
-        <p:spPr>
-          <a:xfrm>
-            <a:off x="939346" y="4870416"/>
-            <a:ext cx="6480720" cy="502800"/>
-          </a:xfrm>
-          <a:prstGeom prst="rect">
-            <a:avLst/>
-          </a:prstGeom>
-        </p:spPr>
-        <p:style>
-          <a:lnRef idx="1">
-            <a:schemeClr val="dk1"/>
-          </a:lnRef>
-          <a:fillRef idx="2">
-            <a:schemeClr val="dk1"/>
-          </a:fillRef>
-          <a:effectRef idx="1">
-            <a:schemeClr val="dk1"/>
-          </a:effectRef>
-          <a:fontRef idx="minor">
-            <a:schemeClr val="dk1"/>
-          </a:fontRef>
-        </p:style>
-        <p:txBody>
-          <a:bodyPr rtlCol="0" anchor="ctr"/>
-          <a:lstStyle/>
-          <a:p>
-            <a:pPr algn="ctr"/>
-            <a:r>
-              <a:rPr lang="en-GB" dirty="0"/>
-              <a:t>Bootstrapping SPI</a:t>
             </a:r>
           </a:p>
         </p:txBody>

</xml_diff>